<commit_message>
adding poster examples from past years
</commit_message>
<xml_diff>
--- a/ew495poster/Marcello RCE Poster 40x30 (1).pptx
+++ b/ew495poster/Marcello RCE Poster 40x30 (1).pptx
@@ -234,7 +234,7 @@
           <a:p>
             <a:fld id="{2209E7E8-E025-46C0-A89E-1C453D0533C1}" type="datetimeFigureOut">
               <a:rPr lang="en-US" smtClean="0"/>
-              <a:t>11/29/2019</a:t>
+              <a:t>12/2/2019</a:t>
             </a:fld>
             <a:endParaRPr lang="en-US"/>
           </a:p>
@@ -852,7 +852,7 @@
             <a:fld id="{84F3580F-AF95-4FF6-946D-98F6794E95B3}" type="datetimeFigureOut">
               <a:rPr lang="en-US" smtClean="0"/>
               <a:pPr/>
-              <a:t>11/29/2019</a:t>
+              <a:t>12/2/2019</a:t>
             </a:fld>
             <a:endParaRPr lang="en-US" dirty="0"/>
           </a:p>
@@ -1017,7 +1017,7 @@
             <a:fld id="{84F3580F-AF95-4FF6-946D-98F6794E95B3}" type="datetimeFigureOut">
               <a:rPr lang="en-US" smtClean="0"/>
               <a:pPr/>
-              <a:t>11/29/2019</a:t>
+              <a:t>12/2/2019</a:t>
             </a:fld>
             <a:endParaRPr lang="en-US" dirty="0"/>
           </a:p>
@@ -1192,7 +1192,7 @@
             <a:fld id="{84F3580F-AF95-4FF6-946D-98F6794E95B3}" type="datetimeFigureOut">
               <a:rPr lang="en-US" smtClean="0"/>
               <a:pPr/>
-              <a:t>11/29/2019</a:t>
+              <a:t>12/2/2019</a:t>
             </a:fld>
             <a:endParaRPr lang="en-US" dirty="0"/>
           </a:p>
@@ -1357,7 +1357,7 @@
             <a:fld id="{84F3580F-AF95-4FF6-946D-98F6794E95B3}" type="datetimeFigureOut">
               <a:rPr lang="en-US" smtClean="0"/>
               <a:pPr/>
-              <a:t>11/29/2019</a:t>
+              <a:t>12/2/2019</a:t>
             </a:fld>
             <a:endParaRPr lang="en-US" dirty="0"/>
           </a:p>
@@ -1599,7 +1599,7 @@
             <a:fld id="{84F3580F-AF95-4FF6-946D-98F6794E95B3}" type="datetimeFigureOut">
               <a:rPr lang="en-US" smtClean="0"/>
               <a:pPr/>
-              <a:t>11/29/2019</a:t>
+              <a:t>12/2/2019</a:t>
             </a:fld>
             <a:endParaRPr lang="en-US" dirty="0"/>
           </a:p>
@@ -1881,7 +1881,7 @@
             <a:fld id="{84F3580F-AF95-4FF6-946D-98F6794E95B3}" type="datetimeFigureOut">
               <a:rPr lang="en-US" smtClean="0"/>
               <a:pPr/>
-              <a:t>11/29/2019</a:t>
+              <a:t>12/2/2019</a:t>
             </a:fld>
             <a:endParaRPr lang="en-US" dirty="0"/>
           </a:p>
@@ -2297,7 +2297,7 @@
             <a:fld id="{84F3580F-AF95-4FF6-946D-98F6794E95B3}" type="datetimeFigureOut">
               <a:rPr lang="en-US" smtClean="0"/>
               <a:pPr/>
-              <a:t>11/29/2019</a:t>
+              <a:t>12/2/2019</a:t>
             </a:fld>
             <a:endParaRPr lang="en-US" dirty="0"/>
           </a:p>
@@ -2411,7 +2411,7 @@
             <a:fld id="{84F3580F-AF95-4FF6-946D-98F6794E95B3}" type="datetimeFigureOut">
               <a:rPr lang="en-US" smtClean="0"/>
               <a:pPr/>
-              <a:t>11/29/2019</a:t>
+              <a:t>12/2/2019</a:t>
             </a:fld>
             <a:endParaRPr lang="en-US" dirty="0"/>
           </a:p>
@@ -2503,7 +2503,7 @@
             <a:fld id="{84F3580F-AF95-4FF6-946D-98F6794E95B3}" type="datetimeFigureOut">
               <a:rPr lang="en-US" smtClean="0"/>
               <a:pPr/>
-              <a:t>11/29/2019</a:t>
+              <a:t>12/2/2019</a:t>
             </a:fld>
             <a:endParaRPr lang="en-US" dirty="0"/>
           </a:p>
@@ -2775,7 +2775,7 @@
             <a:fld id="{84F3580F-AF95-4FF6-946D-98F6794E95B3}" type="datetimeFigureOut">
               <a:rPr lang="en-US" smtClean="0"/>
               <a:pPr/>
-              <a:t>11/29/2019</a:t>
+              <a:t>12/2/2019</a:t>
             </a:fld>
             <a:endParaRPr lang="en-US" dirty="0"/>
           </a:p>
@@ -3024,7 +3024,7 @@
             <a:fld id="{84F3580F-AF95-4FF6-946D-98F6794E95B3}" type="datetimeFigureOut">
               <a:rPr lang="en-US" smtClean="0"/>
               <a:pPr/>
-              <a:t>11/29/2019</a:t>
+              <a:t>12/2/2019</a:t>
             </a:fld>
             <a:endParaRPr lang="en-US" dirty="0"/>
           </a:p>
@@ -3232,7 +3232,7 @@
             <a:fld id="{84F3580F-AF95-4FF6-946D-98F6794E95B3}" type="datetimeFigureOut">
               <a:rPr lang="en-US" smtClean="0"/>
               <a:pPr/>
-              <a:t>11/29/2019</a:t>
+              <a:t>12/2/2019</a:t>
             </a:fld>
             <a:endParaRPr lang="en-US" dirty="0"/>
           </a:p>
@@ -3608,7 +3608,7 @@
           <p:cNvPr id="2" name="Rectangle 1">
             <a:extLst>
               <a:ext uri="{FF2B5EF4-FFF2-40B4-BE49-F238E27FC236}">
-                <a16:creationId xmlns:a16="http://schemas.microsoft.com/office/drawing/2014/main" xmlns="" id="{B9B0B1BB-22F9-8543-B666-A1636E1F248D}"/>
+                <a16:creationId xmlns:a16="http://schemas.microsoft.com/office/drawing/2014/main" id="{B9B0B1BB-22F9-8543-B666-A1636E1F248D}"/>
               </a:ext>
             </a:extLst>
           </p:cNvPr>
@@ -4411,7 +4411,7 @@
           <p:cNvPr id="36" name="TextBox 6">
             <a:extLst>
               <a:ext uri="{FF2B5EF4-FFF2-40B4-BE49-F238E27FC236}">
-                <a16:creationId xmlns:a16="http://schemas.microsoft.com/office/drawing/2014/main" xmlns="" id="{C56139DA-DE0C-2F4E-84C6-92ED341B7EFD}"/>
+                <a16:creationId xmlns:a16="http://schemas.microsoft.com/office/drawing/2014/main" id="{C56139DA-DE0C-2F4E-84C6-92ED341B7EFD}"/>
               </a:ext>
             </a:extLst>
           </p:cNvPr>
@@ -4573,7 +4573,7 @@
           <p:cNvPr id="43" name="TextBox 6">
             <a:extLst>
               <a:ext uri="{FF2B5EF4-FFF2-40B4-BE49-F238E27FC236}">
-                <a16:creationId xmlns:a16="http://schemas.microsoft.com/office/drawing/2014/main" xmlns="" id="{AB7078D3-7A07-E049-9730-CC256898589C}"/>
+                <a16:creationId xmlns:a16="http://schemas.microsoft.com/office/drawing/2014/main" id="{AB7078D3-7A07-E049-9730-CC256898589C}"/>
               </a:ext>
             </a:extLst>
           </p:cNvPr>
@@ -4735,7 +4735,7 @@
           <p:cNvPr id="45" name="Text Box 24">
             <a:extLst>
               <a:ext uri="{FF2B5EF4-FFF2-40B4-BE49-F238E27FC236}">
-                <a16:creationId xmlns:a16="http://schemas.microsoft.com/office/drawing/2014/main" xmlns="" id="{B8EDF7D5-53D2-A44D-B558-50F840F28BC7}"/>
+                <a16:creationId xmlns:a16="http://schemas.microsoft.com/office/drawing/2014/main" id="{B8EDF7D5-53D2-A44D-B558-50F840F28BC7}"/>
               </a:ext>
             </a:extLst>
           </p:cNvPr>
@@ -4956,63 +4956,7 @@
                   <a:schemeClr val="bg1"/>
                 </a:solidFill>
               </a:rPr>
-              <a:t>). I hope to </a:t>
-            </a:r>
-            <a:r>
-              <a:rPr lang="en-US" sz="2400" dirty="0" smtClean="0">
-                <a:solidFill>
-                  <a:schemeClr val="bg1"/>
-                </a:solidFill>
-              </a:rPr>
-              <a:t>make use of the study of their </a:t>
-            </a:r>
-            <a:r>
-              <a:rPr lang="en-US" sz="2400" dirty="0" smtClean="0">
-                <a:solidFill>
-                  <a:schemeClr val="bg1"/>
-                </a:solidFill>
-              </a:rPr>
-              <a:t>phenomenal dive maneuvers to </a:t>
-            </a:r>
-            <a:r>
-              <a:rPr lang="en-US" sz="2400" dirty="0" smtClean="0">
-                <a:solidFill>
-                  <a:schemeClr val="bg1"/>
-                </a:solidFill>
-              </a:rPr>
-              <a:t>test the limits of </a:t>
-            </a:r>
-            <a:r>
-              <a:rPr lang="en-US" sz="2400" dirty="0" smtClean="0">
-                <a:solidFill>
-                  <a:schemeClr val="bg1"/>
-                </a:solidFill>
-              </a:rPr>
-              <a:t>quadrotor control at high speeds and torques. Successful research will </a:t>
-            </a:r>
-            <a:r>
-              <a:rPr lang="en-US" sz="2400" dirty="0" smtClean="0">
-                <a:solidFill>
-                  <a:schemeClr val="bg1"/>
-                </a:solidFill>
-              </a:rPr>
-              <a:t>enhance our high-speed control ability </a:t>
-            </a:r>
-            <a:r>
-              <a:rPr lang="en-US" sz="2400" dirty="0" smtClean="0">
-                <a:solidFill>
-                  <a:schemeClr val="bg1"/>
-                </a:solidFill>
-              </a:rPr>
-              <a:t>of quadrotor </a:t>
-            </a:r>
-            <a:r>
-              <a:rPr lang="en-US" sz="2400" dirty="0" smtClean="0">
-                <a:solidFill>
-                  <a:schemeClr val="bg1"/>
-                </a:solidFill>
-              </a:rPr>
-              <a:t>drones to increase their usefulness and application in the public and private sectors.</a:t>
+              <a:t>). I hope to make use of the study of their phenomenal dive maneuvers to test the limits of quadrotor control at high speeds and torques. Successful research will enhance our high-speed control ability of quadrotor drones to increase their usefulness and application in the public and private sectors.</a:t>
             </a:r>
             <a:endParaRPr lang="en-US" sz="2400" dirty="0">
               <a:solidFill>
@@ -5028,7 +4972,7 @@
           <p:cNvPr id="48" name="TextBox 6">
             <a:extLst>
               <a:ext uri="{FF2B5EF4-FFF2-40B4-BE49-F238E27FC236}">
-                <a16:creationId xmlns:a16="http://schemas.microsoft.com/office/drawing/2014/main" xmlns="" id="{39AAD502-ED40-B148-8E51-CBDC9EF5D5A8}"/>
+                <a16:creationId xmlns:a16="http://schemas.microsoft.com/office/drawing/2014/main" id="{39AAD502-ED40-B148-8E51-CBDC9EF5D5A8}"/>
               </a:ext>
             </a:extLst>
           </p:cNvPr>
@@ -5190,7 +5134,7 @@
           <p:cNvPr id="49" name="Text Box 24">
             <a:extLst>
               <a:ext uri="{FF2B5EF4-FFF2-40B4-BE49-F238E27FC236}">
-                <a16:creationId xmlns:a16="http://schemas.microsoft.com/office/drawing/2014/main" xmlns="" id="{4F7D7BBB-7D90-1247-BC00-FC4AECB10F94}"/>
+                <a16:creationId xmlns:a16="http://schemas.microsoft.com/office/drawing/2014/main" id="{4F7D7BBB-7D90-1247-BC00-FC4AECB10F94}"/>
               </a:ext>
             </a:extLst>
           </p:cNvPr>
@@ -5361,7 +5305,7 @@
             <a:r>
               <a:rPr lang="en-US" sz="2800" dirty="0" smtClean="0">
                 <a:solidFill>
-                  <a:srgbClr val="FF0000"/>
+                  <a:schemeClr val="bg1"/>
                 </a:solidFill>
                 <a:latin typeface="Minion Pro" panose="02040503050306020203"/>
               </a:rPr>
@@ -5390,7 +5334,7 @@
           <p:cNvPr id="54" name="TextBox 6">
             <a:extLst>
               <a:ext uri="{FF2B5EF4-FFF2-40B4-BE49-F238E27FC236}">
-                <a16:creationId xmlns:a16="http://schemas.microsoft.com/office/drawing/2014/main" xmlns="" id="{A02677C0-3182-1744-88D1-3C5A668DCB1C}"/>
+                <a16:creationId xmlns:a16="http://schemas.microsoft.com/office/drawing/2014/main" id="{A02677C0-3182-1744-88D1-3C5A668DCB1C}"/>
               </a:ext>
             </a:extLst>
           </p:cNvPr>
@@ -5552,7 +5496,7 @@
           <p:cNvPr id="57" name="TextBox 6">
             <a:extLst>
               <a:ext uri="{FF2B5EF4-FFF2-40B4-BE49-F238E27FC236}">
-                <a16:creationId xmlns:a16="http://schemas.microsoft.com/office/drawing/2014/main" xmlns="" id="{D7176067-E763-AD45-8EB8-25F4978B17F4}"/>
+                <a16:creationId xmlns:a16="http://schemas.microsoft.com/office/drawing/2014/main" id="{D7176067-E763-AD45-8EB8-25F4978B17F4}"/>
               </a:ext>
             </a:extLst>
           </p:cNvPr>
@@ -5714,7 +5658,7 @@
           <p:cNvPr id="58" name="Text Box 24">
             <a:extLst>
               <a:ext uri="{FF2B5EF4-FFF2-40B4-BE49-F238E27FC236}">
-                <a16:creationId xmlns:a16="http://schemas.microsoft.com/office/drawing/2014/main" xmlns="" id="{723B0B7F-4EF9-A84F-AE5E-930BD6FC66ED}"/>
+                <a16:creationId xmlns:a16="http://schemas.microsoft.com/office/drawing/2014/main" id="{723B0B7F-4EF9-A84F-AE5E-930BD6FC66ED}"/>
               </a:ext>
             </a:extLst>
           </p:cNvPr>
@@ -5905,7 +5849,7 @@
           <p:cNvPr id="9" name="Picture 8">
             <a:extLst>
               <a:ext uri="{FF2B5EF4-FFF2-40B4-BE49-F238E27FC236}">
-                <a16:creationId xmlns:a16="http://schemas.microsoft.com/office/drawing/2014/main" xmlns="" id="{8BBB48DF-7760-EF4E-A843-57ABFA6EE848}"/>
+                <a16:creationId xmlns:a16="http://schemas.microsoft.com/office/drawing/2014/main" id="{8BBB48DF-7760-EF4E-A843-57ABFA6EE848}"/>
               </a:ext>
             </a:extLst>
           </p:cNvPr>
@@ -5940,7 +5884,7 @@
           <p:cNvPr id="22" name="TextBox 6">
             <a:extLst>
               <a:ext uri="{FF2B5EF4-FFF2-40B4-BE49-F238E27FC236}">
-                <a16:creationId xmlns:a16="http://schemas.microsoft.com/office/drawing/2014/main" xmlns="" id="{FA91D9F4-0072-49D7-9D5F-07E94BA0E627}"/>
+                <a16:creationId xmlns:a16="http://schemas.microsoft.com/office/drawing/2014/main" id="{FA91D9F4-0072-49D7-9D5F-07E94BA0E627}"/>
               </a:ext>
             </a:extLst>
           </p:cNvPr>
@@ -6102,7 +6046,7 @@
           <p:cNvPr id="23" name="TextBox 6">
             <a:extLst>
               <a:ext uri="{FF2B5EF4-FFF2-40B4-BE49-F238E27FC236}">
-                <a16:creationId xmlns:a16="http://schemas.microsoft.com/office/drawing/2014/main" xmlns="" id="{11D5D41C-AE5C-4977-ACDE-2D587738EE96}"/>
+                <a16:creationId xmlns:a16="http://schemas.microsoft.com/office/drawing/2014/main" id="{11D5D41C-AE5C-4977-ACDE-2D587738EE96}"/>
               </a:ext>
             </a:extLst>
           </p:cNvPr>
@@ -6264,7 +6208,7 @@
           <p:cNvPr id="55" name="Text Box 24">
             <a:extLst>
               <a:ext uri="{FF2B5EF4-FFF2-40B4-BE49-F238E27FC236}">
-                <a16:creationId xmlns:a16="http://schemas.microsoft.com/office/drawing/2014/main" xmlns="" id="{DC932C92-0DE0-A249-9B18-27B56BDFE705}"/>
+                <a16:creationId xmlns:a16="http://schemas.microsoft.com/office/drawing/2014/main" id="{DC932C92-0DE0-A249-9B18-27B56BDFE705}"/>
               </a:ext>
             </a:extLst>
           </p:cNvPr>
@@ -6513,7 +6457,7 @@
           <p:cNvPr id="25" name="Text Box 24">
             <a:extLst>
               <a:ext uri="{FF2B5EF4-FFF2-40B4-BE49-F238E27FC236}">
-                <a16:creationId xmlns:a16="http://schemas.microsoft.com/office/drawing/2014/main" xmlns="" id="{C2A8878D-E02F-4BF9-B194-EE211DB3E27C}"/>
+                <a16:creationId xmlns:a16="http://schemas.microsoft.com/office/drawing/2014/main" id="{C2A8878D-E02F-4BF9-B194-EE211DB3E27C}"/>
               </a:ext>
             </a:extLst>
           </p:cNvPr>
@@ -6706,16 +6650,7 @@
                 </a:solidFill>
                 <a:latin typeface="Minion Pro" panose="02040503050306020203"/>
               </a:rPr>
-              <a:t> trajectory, a quadrotor MATLAB </a:t>
-            </a:r>
-            <a:r>
-              <a:rPr lang="en-US" sz="2800" dirty="0" smtClean="0">
-                <a:solidFill>
-                  <a:srgbClr val="EFF0F1"/>
-                </a:solidFill>
-                <a:latin typeface="Minion Pro" panose="02040503050306020203"/>
-              </a:rPr>
-              <a:t>Simulink simulation, a </a:t>
+              <a:t> trajectory, a quadrotor MATLAB Simulink simulation, a </a:t>
             </a:r>
             <a:r>
               <a:rPr lang="en-US" sz="2800" dirty="0" err="1" smtClean="0">
@@ -6769,34 +6704,7 @@
                 </a:solidFill>
                 <a:latin typeface="Minion Pro" panose="02040503050306020203"/>
               </a:rPr>
-              <a:t>),  a suitable controller will be developed to fly a quadrotor autonomously to mimic a scaled-down representative hummingbird dive trajectory. Attempts will first be made in simulation, and then </a:t>
-            </a:r>
-            <a:r>
-              <a:rPr lang="en-US" sz="2800" dirty="0" smtClean="0">
-                <a:solidFill>
-                  <a:srgbClr val="EFF0F1"/>
-                </a:solidFill>
-                <a:latin typeface="Minion Pro" panose="02040503050306020203"/>
-              </a:rPr>
-              <a:t>in proof of concept demonstration. </a:t>
-            </a:r>
-            <a:r>
-              <a:rPr lang="en-US" sz="2800" dirty="0" smtClean="0">
-                <a:solidFill>
-                  <a:srgbClr val="EFF0F1"/>
-                </a:solidFill>
-                <a:latin typeface="Minion Pro" panose="02040503050306020203"/>
-              </a:rPr>
-              <a:t>Successful trials will demonstrate a root mean square error (RMSE) between the desired trajectory and the actual trajectory of less than 10cm with a 5cm standard deviation over the entire dataset. These </a:t>
-            </a:r>
-            <a:r>
-              <a:rPr lang="en-US" sz="2800" dirty="0" smtClean="0">
-                <a:solidFill>
-                  <a:srgbClr val="EFF0F1"/>
-                </a:solidFill>
-                <a:latin typeface="Minion Pro" panose="02040503050306020203"/>
-              </a:rPr>
-              <a:t>errors will be calculated between the </a:t>
+              <a:t>),  a suitable controller will be developed to fly a quadrotor autonomously to mimic a scaled-down representative hummingbird dive trajectory. Attempts will first be made in simulation, and then in proof of concept demonstration. Successful trials will demonstrate a root mean square error (RMSE) between the desired trajectory and the actual trajectory of less than 10cm with a 5cm standard deviation over the entire dataset. These errors will be calculated between the </a:t>
             </a:r>
             <a:r>
               <a:rPr lang="en-US" sz="2800" dirty="0" err="1" smtClean="0">
@@ -6814,16 +6722,7 @@
                 </a:solidFill>
                 <a:latin typeface="Minion Pro" panose="02040503050306020203"/>
               </a:rPr>
-              <a:t> position data for each pair of data points with the same time stamp. (other assumptions?)</a:t>
-            </a:r>
-            <a:r>
-              <a:rPr lang="en-US" sz="2800" dirty="0" smtClean="0">
-                <a:solidFill>
-                  <a:srgbClr val="EFF0F1"/>
-                </a:solidFill>
-                <a:latin typeface="Minion Pro" panose="02040503050306020203"/>
-              </a:rPr>
-              <a:t> </a:t>
+              <a:t> position data for each pair of data points with the same time stamp. (other assumptions?) </a:t>
             </a:r>
             <a:endParaRPr lang="en-US" sz="2800" dirty="0">
               <a:solidFill>
@@ -6839,7 +6738,7 @@
           <p:cNvPr id="26" name="Text Box 24">
             <a:extLst>
               <a:ext uri="{FF2B5EF4-FFF2-40B4-BE49-F238E27FC236}">
-                <a16:creationId xmlns:a16="http://schemas.microsoft.com/office/drawing/2014/main" xmlns="" id="{63D96645-CC56-42E3-9AE0-DED59BDE94AC}"/>
+                <a16:creationId xmlns:a16="http://schemas.microsoft.com/office/drawing/2014/main" id="{63D96645-CC56-42E3-9AE0-DED59BDE94AC}"/>
               </a:ext>
             </a:extLst>
           </p:cNvPr>
@@ -7048,7 +6947,7 @@
           <p:cNvPr id="29" name="Text Box 24">
             <a:extLst>
               <a:ext uri="{FF2B5EF4-FFF2-40B4-BE49-F238E27FC236}">
-                <a16:creationId xmlns:a16="http://schemas.microsoft.com/office/drawing/2014/main" xmlns="" id="{B0409770-80DF-497F-AF90-A79DD05D12EF}"/>
+                <a16:creationId xmlns:a16="http://schemas.microsoft.com/office/drawing/2014/main" id="{B0409770-80DF-497F-AF90-A79DD05D12EF}"/>
               </a:ext>
             </a:extLst>
           </p:cNvPr>
@@ -7371,7 +7270,7 @@
           <p:cNvPr id="30" name="Text Box 24">
             <a:extLst>
               <a:ext uri="{FF2B5EF4-FFF2-40B4-BE49-F238E27FC236}">
-                <a16:creationId xmlns:a16="http://schemas.microsoft.com/office/drawing/2014/main" xmlns="" id="{0B1E17B3-28C2-4267-91CA-AB63A39B00DE}"/>
+                <a16:creationId xmlns:a16="http://schemas.microsoft.com/office/drawing/2014/main" id="{0B1E17B3-28C2-4267-91CA-AB63A39B00DE}"/>
               </a:ext>
             </a:extLst>
           </p:cNvPr>
@@ -7557,7 +7456,7 @@
           <p:cNvPr id="6" name="Rectangle 5">
             <a:extLst>
               <a:ext uri="{FF2B5EF4-FFF2-40B4-BE49-F238E27FC236}">
-                <a16:creationId xmlns:a16="http://schemas.microsoft.com/office/drawing/2014/main" xmlns="" id="{155E3534-E6BA-4AE4-90BA-6454D43F5189}"/>
+                <a16:creationId xmlns:a16="http://schemas.microsoft.com/office/drawing/2014/main" id="{155E3534-E6BA-4AE4-90BA-6454D43F5189}"/>
               </a:ext>
             </a:extLst>
           </p:cNvPr>
@@ -7598,7 +7497,7 @@
           <p:cNvPr id="32" name="Text Box 24">
             <a:extLst>
               <a:ext uri="{FF2B5EF4-FFF2-40B4-BE49-F238E27FC236}">
-                <a16:creationId xmlns:a16="http://schemas.microsoft.com/office/drawing/2014/main" xmlns="" id="{CF33B082-BC78-4BA7-83E7-ED83299C5457}"/>
+                <a16:creationId xmlns:a16="http://schemas.microsoft.com/office/drawing/2014/main" id="{CF33B082-BC78-4BA7-83E7-ED83299C5457}"/>
               </a:ext>
             </a:extLst>
           </p:cNvPr>
@@ -7800,16 +7699,7 @@
                 </a:solidFill>
                 <a:latin typeface="Minion Pro" panose="02040503050306020203"/>
               </a:rPr>
-              <a:t>. The next step is to obtain data from an autonomous flight using a basic position controller as in the simulation. Additionally, the trajectory controller will undergo basic tuning, consider saturation limits and incorporate additional linearization regions of control for different stages of the dive.</a:t>
-            </a:r>
-            <a:r>
-              <a:rPr lang="en-US" sz="2800" dirty="0" smtClean="0">
-                <a:solidFill>
-                  <a:srgbClr val="EFF0F1"/>
-                </a:solidFill>
-                <a:latin typeface="Minion Pro" panose="02040503050306020203"/>
-              </a:rPr>
-              <a:t> </a:t>
+              <a:t>. The next step is to obtain data from an autonomous flight using a basic position controller as in the simulation. Additionally, the trajectory controller will undergo basic tuning, consider saturation limits and incorporate additional linearization regions of control for different stages of the dive. </a:t>
             </a:r>
             <a:endParaRPr lang="en-US" sz="2800" dirty="0">
               <a:solidFill>
@@ -7825,7 +7715,7 @@
           <p:cNvPr id="7" name="AutoShape 2" descr="A 3D terrestrial lidar scan of the Interstate 510 bridge in New Orleans">
             <a:extLst>
               <a:ext uri="{FF2B5EF4-FFF2-40B4-BE49-F238E27FC236}">
-                <a16:creationId xmlns:a16="http://schemas.microsoft.com/office/drawing/2014/main" xmlns="" id="{42171AC6-D75F-4F28-B0AD-F22C1538E39A}"/>
+                <a16:creationId xmlns:a16="http://schemas.microsoft.com/office/drawing/2014/main" id="{42171AC6-D75F-4F28-B0AD-F22C1538E39A}"/>
               </a:ext>
             </a:extLst>
           </p:cNvPr>
@@ -7871,7 +7761,7 @@
           <p:cNvPr id="35" name="Text Box 24">
             <a:extLst>
               <a:ext uri="{FF2B5EF4-FFF2-40B4-BE49-F238E27FC236}">
-                <a16:creationId xmlns:a16="http://schemas.microsoft.com/office/drawing/2014/main" xmlns="" id="{B96D240A-6B92-4F4B-8599-A841A1F2DFD9}"/>
+                <a16:creationId xmlns:a16="http://schemas.microsoft.com/office/drawing/2014/main" id="{B96D240A-6B92-4F4B-8599-A841A1F2DFD9}"/>
               </a:ext>
             </a:extLst>
           </p:cNvPr>
@@ -8031,7 +7921,7 @@
               </a:spcBef>
             </a:pPr>
             <a:r>
-              <a:rPr lang="en-US" sz="2400" dirty="0">
+              <a:rPr lang="en-US" sz="2400" i="1" dirty="0">
                 <a:solidFill>
                   <a:srgbClr val="1EADB3"/>
                 </a:solidFill>
@@ -8039,7 +7929,7 @@
               <a:t>Figure 1: (a) The five stages of an Anna’s Hummingbird dive maneuver, from </a:t>
             </a:r>
             <a:r>
-              <a:rPr lang="en-US" sz="2400" dirty="0" smtClean="0">
+              <a:rPr lang="en-US" sz="2400" i="1" dirty="0" smtClean="0">
                 <a:solidFill>
                   <a:srgbClr val="1EADB3"/>
                 </a:solidFill>
@@ -8047,7 +7937,7 @@
               <a:t>[Clark 2009]. </a:t>
             </a:r>
             <a:r>
-              <a:rPr lang="en-US" sz="2400" dirty="0">
+              <a:rPr lang="en-US" sz="2400" i="1" dirty="0">
                 <a:solidFill>
                   <a:srgbClr val="1EADB3"/>
                 </a:solidFill>
@@ -8055,7 +7945,7 @@
               <a:t>(b) A quadrotor </a:t>
             </a:r>
             <a:r>
-              <a:rPr lang="en-US" sz="2400" dirty="0" smtClean="0">
+              <a:rPr lang="en-US" sz="2400" i="1" dirty="0" smtClean="0">
                 <a:solidFill>
                   <a:srgbClr val="1EADB3"/>
                 </a:solidFill>
@@ -8063,7 +7953,7 @@
               <a:t>using an aggressive </a:t>
             </a:r>
             <a:r>
-              <a:rPr lang="en-US" sz="2400" dirty="0">
+              <a:rPr lang="en-US" sz="2400" i="1" dirty="0">
                 <a:solidFill>
                   <a:srgbClr val="1EADB3"/>
                 </a:solidFill>
@@ -8071,7 +7961,7 @@
               <a:t>path planning </a:t>
             </a:r>
             <a:r>
-              <a:rPr lang="en-US" sz="2400" dirty="0" smtClean="0">
+              <a:rPr lang="en-US" sz="2400" i="1" dirty="0" smtClean="0">
                 <a:solidFill>
                   <a:srgbClr val="1EADB3"/>
                 </a:solidFill>
@@ -8079,7 +7969,7 @@
               <a:t>algorithm to </a:t>
             </a:r>
             <a:r>
-              <a:rPr lang="en-US" sz="2400" dirty="0">
+              <a:rPr lang="en-US" sz="2400" i="1" dirty="0">
                 <a:solidFill>
                   <a:srgbClr val="1EADB3"/>
                 </a:solidFill>
@@ -8087,7 +7977,7 @@
               <a:t>fly through a thrown hoop, from </a:t>
             </a:r>
             <a:r>
-              <a:rPr lang="en-US" sz="2400" dirty="0" smtClean="0">
+              <a:rPr lang="en-US" sz="2400" i="1" dirty="0" smtClean="0">
                 <a:solidFill>
                   <a:srgbClr val="1EADB3"/>
                 </a:solidFill>
@@ -8099,74 +7989,6 @@
                 <a:srgbClr val="1EADB3"/>
               </a:solidFill>
               <a:latin typeface="Minion Pro" panose="02040503050306020203"/>
-            </a:endParaRPr>
-          </a:p>
-        </p:txBody>
-      </p:sp>
-      <p:sp>
-        <p:nvSpPr>
-          <p:cNvPr id="11" name="TextBox 10">
-            <a:extLst>
-              <a:ext uri="{FF2B5EF4-FFF2-40B4-BE49-F238E27FC236}">
-                <a16:creationId xmlns:a16="http://schemas.microsoft.com/office/drawing/2014/main" xmlns="" id="{C54A7560-C470-4632-90FC-610638217CCB}"/>
-              </a:ext>
-            </a:extLst>
-          </p:cNvPr>
-          <p:cNvSpPr txBox="1"/>
-          <p:nvPr/>
-        </p:nvSpPr>
-        <p:spPr>
-          <a:xfrm>
-            <a:off x="5031497" y="13073934"/>
-            <a:ext cx="4377425" cy="400110"/>
-          </a:xfrm>
-          <a:prstGeom prst="rect">
-            <a:avLst/>
-          </a:prstGeom>
-          <a:noFill/>
-        </p:spPr>
-        <p:txBody>
-          <a:bodyPr wrap="square" rtlCol="0">
-            <a:spAutoFit/>
-          </a:bodyPr>
-          <a:lstStyle/>
-          <a:p>
-            <a:r>
-              <a:rPr lang="en-US" sz="2000" b="1" dirty="0">
-                <a:solidFill>
-                  <a:schemeClr val="bg1"/>
-                </a:solidFill>
-                <a:latin typeface="Courier New" panose="02070309020205020404" pitchFamily="49" charset="0"/>
-                <a:cs typeface="Courier New" panose="02070309020205020404" pitchFamily="49" charset="0"/>
-              </a:rPr>
-              <a:t>Source: </a:t>
-            </a:r>
-            <a:r>
-              <a:rPr lang="en-US" sz="2000" b="1" dirty="0" err="1">
-                <a:solidFill>
-                  <a:schemeClr val="bg1"/>
-                </a:solidFill>
-                <a:latin typeface="Courier New" panose="02070309020205020404" pitchFamily="49" charset="0"/>
-                <a:cs typeface="Courier New" panose="02070309020205020404" pitchFamily="49" charset="0"/>
-              </a:rPr>
-              <a:t>Velodyne</a:t>
-            </a:r>
-            <a:r>
-              <a:rPr lang="en-US" sz="2000" b="1" dirty="0">
-                <a:solidFill>
-                  <a:schemeClr val="bg1"/>
-                </a:solidFill>
-                <a:latin typeface="Courier New" panose="02070309020205020404" pitchFamily="49" charset="0"/>
-                <a:cs typeface="Courier New" panose="02070309020205020404" pitchFamily="49" charset="0"/>
-              </a:rPr>
-              <a:t> Inc. </a:t>
-            </a:r>
-            <a:endParaRPr lang="en-US" sz="7200" b="1" dirty="0">
-              <a:solidFill>
-                <a:schemeClr val="bg1"/>
-              </a:solidFill>
-              <a:latin typeface="Courier New" panose="02070309020205020404" pitchFamily="49" charset="0"/>
-              <a:cs typeface="Courier New" panose="02070309020205020404" pitchFamily="49" charset="0"/>
             </a:endParaRPr>
           </a:p>
         </p:txBody>
@@ -8176,7 +7998,7 @@
           <p:cNvPr id="12" name="AutoShape 4" descr="Image result for mechanical drawing">
             <a:extLst>
               <a:ext uri="{FF2B5EF4-FFF2-40B4-BE49-F238E27FC236}">
-                <a16:creationId xmlns:a16="http://schemas.microsoft.com/office/drawing/2014/main" xmlns="" id="{8C42C160-AD6F-4118-AF98-EF9B64F27409}"/>
+                <a16:creationId xmlns:a16="http://schemas.microsoft.com/office/drawing/2014/main" id="{8C42C160-AD6F-4118-AF98-EF9B64F27409}"/>
               </a:ext>
             </a:extLst>
           </p:cNvPr>
@@ -8222,7 +8044,7 @@
           <p:cNvPr id="46" name="Text Box 24">
             <a:extLst>
               <a:ext uri="{FF2B5EF4-FFF2-40B4-BE49-F238E27FC236}">
-                <a16:creationId xmlns:a16="http://schemas.microsoft.com/office/drawing/2014/main" xmlns="" id="{40463F0C-A75D-450E-B229-3303BD76D736}"/>
+                <a16:creationId xmlns:a16="http://schemas.microsoft.com/office/drawing/2014/main" id="{40463F0C-A75D-450E-B229-3303BD76D736}"/>
               </a:ext>
             </a:extLst>
           </p:cNvPr>
@@ -8388,25 +8210,7 @@
                 </a:solidFill>
                 <a:latin typeface="Minion Pro" panose="02040503050306020203"/>
               </a:rPr>
-              <a:t> Figure </a:t>
-            </a:r>
-            <a:r>
-              <a:rPr lang="en-US" sz="2800" b="1" i="1" dirty="0" smtClean="0">
-                <a:solidFill>
-                  <a:srgbClr val="1EADB3"/>
-                </a:solidFill>
-                <a:latin typeface="Minion Pro" panose="02040503050306020203"/>
-              </a:rPr>
-              <a:t>2: </a:t>
-            </a:r>
-            <a:r>
-              <a:rPr lang="en-US" sz="2800" b="1" i="1" dirty="0" smtClean="0">
-                <a:solidFill>
-                  <a:srgbClr val="1EADB3"/>
-                </a:solidFill>
-                <a:latin typeface="Minion Pro" panose="02040503050306020203"/>
-              </a:rPr>
-              <a:t>(a, b) Simulated quadrotor flying a commanded “Diamond” trajectory</a:t>
+              <a:t> Figure 2: (a, b) Simulated quadrotor flying a commanded “Diamond” trajectory</a:t>
             </a:r>
             <a:r>
               <a:rPr lang="en-US" sz="2800" b="1" i="1" dirty="0">
@@ -8440,7 +8244,7 @@
           <p:cNvPr id="47" name="Text Box 24">
             <a:extLst>
               <a:ext uri="{FF2B5EF4-FFF2-40B4-BE49-F238E27FC236}">
-                <a16:creationId xmlns:a16="http://schemas.microsoft.com/office/drawing/2014/main" xmlns="" id="{C79FC9F3-432E-4F60-91B2-6DB09A3F6BD7}"/>
+                <a16:creationId xmlns:a16="http://schemas.microsoft.com/office/drawing/2014/main" id="{C79FC9F3-432E-4F60-91B2-6DB09A3F6BD7}"/>
               </a:ext>
             </a:extLst>
           </p:cNvPr>
@@ -8622,7 +8426,7 @@
           <p:cNvPr id="50" name="Text Box 24">
             <a:extLst>
               <a:ext uri="{FF2B5EF4-FFF2-40B4-BE49-F238E27FC236}">
-                <a16:creationId xmlns:a16="http://schemas.microsoft.com/office/drawing/2014/main" xmlns="" id="{5E91393B-40BC-41D8-8CE7-907E36438189}"/>
+                <a16:creationId xmlns:a16="http://schemas.microsoft.com/office/drawing/2014/main" id="{5E91393B-40BC-41D8-8CE7-907E36438189}"/>
               </a:ext>
             </a:extLst>
           </p:cNvPr>
@@ -8808,7 +8612,7 @@
           <p:cNvPr id="17" name="Table 16">
             <a:extLst>
               <a:ext uri="{FF2B5EF4-FFF2-40B4-BE49-F238E27FC236}">
-                <a16:creationId xmlns:a16="http://schemas.microsoft.com/office/drawing/2014/main" xmlns="" id="{03D5C8D0-A364-4B75-85A5-AE304984C3DC}"/>
+                <a16:creationId xmlns:a16="http://schemas.microsoft.com/office/drawing/2014/main" id="{03D5C8D0-A364-4B75-85A5-AE304984C3DC}"/>
               </a:ext>
             </a:extLst>
           </p:cNvPr>
@@ -8818,7 +8622,7 @@
           <p:nvPr>
             <p:extLst>
               <p:ext uri="{D42A27DB-BD31-4B8C-83A1-F6EECF244321}">
-                <p14:modId xmlns:p14="http://schemas.microsoft.com/office/powerpoint/2010/main" val="2779369256"/>
+                <p14:modId xmlns:p14="http://schemas.microsoft.com/office/powerpoint/2010/main" val="1439372700"/>
               </p:ext>
             </p:extLst>
           </p:nvPr>
@@ -8837,21 +8641,21 @@
                 <a:gridCol w="2641600">
                   <a:extLst>
                     <a:ext uri="{9D8B030D-6E8A-4147-A177-3AD203B41FA5}">
-                      <a16:colId xmlns:a16="http://schemas.microsoft.com/office/drawing/2014/main" xmlns="" val="625045779"/>
+                      <a16:colId xmlns:a16="http://schemas.microsoft.com/office/drawing/2014/main" val="625045779"/>
                     </a:ext>
                   </a:extLst>
                 </a:gridCol>
                 <a:gridCol w="2641600">
                   <a:extLst>
                     <a:ext uri="{9D8B030D-6E8A-4147-A177-3AD203B41FA5}">
-                      <a16:colId xmlns:a16="http://schemas.microsoft.com/office/drawing/2014/main" xmlns="" val="1777518787"/>
+                      <a16:colId xmlns:a16="http://schemas.microsoft.com/office/drawing/2014/main" val="1777518787"/>
                     </a:ext>
                   </a:extLst>
                 </a:gridCol>
                 <a:gridCol w="2641600">
                   <a:extLst>
                     <a:ext uri="{9D8B030D-6E8A-4147-A177-3AD203B41FA5}">
-                      <a16:colId xmlns:a16="http://schemas.microsoft.com/office/drawing/2014/main" xmlns="" val="1813779465"/>
+                      <a16:colId xmlns:a16="http://schemas.microsoft.com/office/drawing/2014/main" val="1813779465"/>
                     </a:ext>
                   </a:extLst>
                 </a:gridCol>
@@ -9078,7 +8882,7 @@
                 </a:tc>
                 <a:extLst>
                   <a:ext uri="{0D108BD9-81ED-4DB2-BD59-A6C34878D82A}">
-                    <a16:rowId xmlns:a16="http://schemas.microsoft.com/office/drawing/2014/main" xmlns="" val="3801026980"/>
+                    <a16:rowId xmlns:a16="http://schemas.microsoft.com/office/drawing/2014/main" val="3801026980"/>
                   </a:ext>
                 </a:extLst>
               </a:tr>
@@ -9165,7 +8969,7 @@
                       <a:r>
                         <a:rPr lang="en-US" sz="3200" dirty="0" smtClean="0">
                           <a:solidFill>
-                            <a:schemeClr val="tx1"/>
+                            <a:srgbClr val="FF0000"/>
                           </a:solidFill>
                           <a:latin typeface="Minion Pro" panose="02040503050306020203"/>
                         </a:rPr>
@@ -9173,7 +8977,7 @@
                       </a:r>
                       <a:endParaRPr lang="en-US" sz="3200" dirty="0">
                         <a:solidFill>
-                          <a:schemeClr val="tx1"/>
+                          <a:srgbClr val="FF0000"/>
                         </a:solidFill>
                         <a:latin typeface="Minion Pro" panose="02040503050306020203"/>
                       </a:endParaRPr>
@@ -9238,7 +9042,7 @@
                       <a:r>
                         <a:rPr lang="en-US" sz="3200" dirty="0">
                           <a:solidFill>
-                            <a:schemeClr val="tx1"/>
+                            <a:srgbClr val="FF0000"/>
                           </a:solidFill>
                           <a:latin typeface="Minion Pro" panose="02040503050306020203"/>
                         </a:rPr>
@@ -9298,7 +9102,7 @@
                 </a:tc>
                 <a:extLst>
                   <a:ext uri="{0D108BD9-81ED-4DB2-BD59-A6C34878D82A}">
-                    <a16:rowId xmlns:a16="http://schemas.microsoft.com/office/drawing/2014/main" xmlns="" val="2564285550"/>
+                    <a16:rowId xmlns:a16="http://schemas.microsoft.com/office/drawing/2014/main" val="2564285550"/>
                   </a:ext>
                 </a:extLst>
               </a:tr>
@@ -9385,7 +9189,7 @@
                       <a:r>
                         <a:rPr lang="en-US" sz="3200" dirty="0" smtClean="0">
                           <a:solidFill>
-                            <a:schemeClr val="tx1"/>
+                            <a:srgbClr val="FF0000"/>
                           </a:solidFill>
                           <a:latin typeface="Minion Pro" panose="02040503050306020203"/>
                         </a:rPr>
@@ -9393,7 +9197,7 @@
                       </a:r>
                       <a:endParaRPr lang="en-US" sz="3200" dirty="0">
                         <a:solidFill>
-                          <a:schemeClr val="tx1"/>
+                          <a:srgbClr val="FF0000"/>
                         </a:solidFill>
                         <a:latin typeface="Minion Pro" panose="02040503050306020203"/>
                       </a:endParaRPr>
@@ -9458,7 +9262,7 @@
                       <a:r>
                         <a:rPr lang="en-US" sz="3200" dirty="0" smtClean="0">
                           <a:solidFill>
-                            <a:schemeClr val="tx1"/>
+                            <a:srgbClr val="FF0000"/>
                           </a:solidFill>
                           <a:latin typeface="Minion Pro" panose="02040503050306020203"/>
                         </a:rPr>
@@ -9518,7 +9322,7 @@
                 </a:tc>
                 <a:extLst>
                   <a:ext uri="{0D108BD9-81ED-4DB2-BD59-A6C34878D82A}">
-                    <a16:rowId xmlns:a16="http://schemas.microsoft.com/office/drawing/2014/main" xmlns="" val="3836685659"/>
+                    <a16:rowId xmlns:a16="http://schemas.microsoft.com/office/drawing/2014/main" val="3836685659"/>
                   </a:ext>
                 </a:extLst>
               </a:tr>
@@ -9605,7 +9409,7 @@
                       <a:r>
                         <a:rPr lang="en-US" sz="3200" dirty="0" smtClean="0">
                           <a:solidFill>
-                            <a:schemeClr val="tx1"/>
+                            <a:srgbClr val="FF0000"/>
                           </a:solidFill>
                           <a:latin typeface="Minion Pro" panose="02040503050306020203"/>
                         </a:rPr>
@@ -9613,7 +9417,7 @@
                       </a:r>
                       <a:endParaRPr lang="en-US" sz="3200" dirty="0">
                         <a:solidFill>
-                          <a:schemeClr val="tx1"/>
+                          <a:srgbClr val="FF0000"/>
                         </a:solidFill>
                         <a:latin typeface="Minion Pro" panose="02040503050306020203"/>
                       </a:endParaRPr>
@@ -9678,7 +9482,7 @@
                       <a:r>
                         <a:rPr lang="en-US" sz="3200" dirty="0" smtClean="0">
                           <a:solidFill>
-                            <a:schemeClr val="tx1"/>
+                            <a:srgbClr val="FF0000"/>
                           </a:solidFill>
                           <a:latin typeface="Minion Pro" panose="02040503050306020203"/>
                         </a:rPr>
@@ -9738,7 +9542,7 @@
                 </a:tc>
                 <a:extLst>
                   <a:ext uri="{0D108BD9-81ED-4DB2-BD59-A6C34878D82A}">
-                    <a16:rowId xmlns:a16="http://schemas.microsoft.com/office/drawing/2014/main" xmlns="" val="3333203823"/>
+                    <a16:rowId xmlns:a16="http://schemas.microsoft.com/office/drawing/2014/main" val="3333203823"/>
                   </a:ext>
                 </a:extLst>
               </a:tr>
@@ -9751,7 +9555,7 @@
           <p:cNvPr id="56" name="Text Box 24">
             <a:extLst>
               <a:ext uri="{FF2B5EF4-FFF2-40B4-BE49-F238E27FC236}">
-                <a16:creationId xmlns:a16="http://schemas.microsoft.com/office/drawing/2014/main" xmlns="" id="{9713FF2A-28C9-404B-94A8-2E92E06F801C}"/>
+                <a16:creationId xmlns:a16="http://schemas.microsoft.com/office/drawing/2014/main" id="{9713FF2A-28C9-404B-94A8-2E92E06F801C}"/>
               </a:ext>
             </a:extLst>
           </p:cNvPr>
@@ -9953,16 +9757,7 @@
                 </a:solidFill>
                 <a:latin typeface="Minion Pro" panose="02040503050306020203"/>
               </a:rPr>
-              <a:t>): </a:t>
-            </a:r>
-            <a:r>
-              <a:rPr lang="en-US" sz="2800" b="1" i="1" dirty="0" smtClean="0">
-                <a:solidFill>
-                  <a:srgbClr val="1EADB3"/>
-                </a:solidFill>
-                <a:latin typeface="Minion Pro" panose="02040503050306020203"/>
-              </a:rPr>
-              <a:t>Simulated </a:t>
+              <a:t>): Simulated </a:t>
             </a:r>
             <a:r>
               <a:rPr lang="en-US" sz="2800" b="1" i="1" dirty="0" err="1" smtClean="0">
@@ -9980,43 +9775,7 @@
                 </a:solidFill>
                 <a:latin typeface="Minion Pro" panose="02040503050306020203"/>
               </a:rPr>
-              <a:t>  flying the true Hummingbird trajectory at  </a:t>
-            </a:r>
-            <a:r>
-              <a:rPr lang="en-US" sz="2800" b="1" i="1" dirty="0" smtClean="0">
-                <a:solidFill>
-                  <a:srgbClr val="1EADB3"/>
-                </a:solidFill>
-                <a:latin typeface="Minion Pro" panose="02040503050306020203"/>
-              </a:rPr>
-              <a:t>one fifth, one tenth, and one twentieth </a:t>
-            </a:r>
-            <a:r>
-              <a:rPr lang="en-US" sz="2800" b="1" i="1" dirty="0" smtClean="0">
-                <a:solidFill>
-                  <a:srgbClr val="1EADB3"/>
-                </a:solidFill>
-                <a:latin typeface="Minion Pro" panose="02040503050306020203"/>
-              </a:rPr>
-              <a:t>the actual </a:t>
-            </a:r>
-            <a:r>
-              <a:rPr lang="en-US" sz="2800" b="1" i="1" dirty="0" smtClean="0">
-                <a:solidFill>
-                  <a:srgbClr val="1EADB3"/>
-                </a:solidFill>
-                <a:latin typeface="Minion Pro" panose="02040503050306020203"/>
-              </a:rPr>
-              <a:t>Hummingbird’s speed</a:t>
-            </a:r>
-            <a:r>
-              <a:rPr lang="en-US" sz="2800" b="1" i="1" dirty="0" smtClean="0">
-                <a:solidFill>
-                  <a:srgbClr val="1EADB3"/>
-                </a:solidFill>
-                <a:latin typeface="Minion Pro" panose="02040503050306020203"/>
-              </a:rPr>
-              <a:t>.</a:t>
+              <a:t>  flying the true Hummingbird trajectory at  one fifth, one tenth, and one twentieth the actual Hummingbird’s speed.</a:t>
             </a:r>
             <a:endParaRPr lang="en-US" sz="2800" b="1" i="1" dirty="0">
               <a:solidFill>
@@ -10032,7 +9791,7 @@
           <p:cNvPr id="59" name="Text Box 24">
             <a:extLst>
               <a:ext uri="{FF2B5EF4-FFF2-40B4-BE49-F238E27FC236}">
-                <a16:creationId xmlns:a16="http://schemas.microsoft.com/office/drawing/2014/main" xmlns="" id="{3305F9E6-E63B-4574-B571-343398B88F49}"/>
+                <a16:creationId xmlns:a16="http://schemas.microsoft.com/office/drawing/2014/main" id="{3305F9E6-E63B-4574-B571-343398B88F49}"/>
               </a:ext>
             </a:extLst>
           </p:cNvPr>
@@ -10198,23 +9957,26 @@
                 </a:solidFill>
                 <a:latin typeface="Minion Pro" panose="02040503050306020203"/>
               </a:rPr>
-              <a:t>Figure 3: Annotate </a:t>
-            </a:r>
-            <a:r>
-              <a:rPr lang="en-US" sz="2800" b="1" i="1" dirty="0" smtClean="0">
+              <a:t>Figure 3: Annotate photo </a:t>
+            </a:r>
+            <a:r>
+              <a:rPr lang="en-US" sz="2800" b="1" i="1" dirty="0">
                 <a:solidFill>
                   <a:srgbClr val="1EADB3"/>
                 </a:solidFill>
                 <a:latin typeface="Minion Pro" panose="02040503050306020203"/>
               </a:rPr>
-              <a:t>photo like this.</a:t>
-            </a:r>
-            <a:endParaRPr lang="en-US" sz="2800" b="1" i="1" dirty="0">
-              <a:solidFill>
-                <a:srgbClr val="1EADB3"/>
-              </a:solidFill>
-              <a:latin typeface="Minion Pro" panose="02040503050306020203"/>
-            </a:endParaRPr>
+              <a:t> </a:t>
+            </a:r>
+            <a:r>
+              <a:rPr lang="en-US" sz="2800" b="1" i="1" dirty="0" smtClean="0">
+                <a:solidFill>
+                  <a:srgbClr val="1EADB3"/>
+                </a:solidFill>
+                <a:latin typeface="Minion Pro" panose="02040503050306020203"/>
+              </a:rPr>
+              <a:t>with labels and arrows</a:t>
+            </a:r>
           </a:p>
         </p:txBody>
       </p:sp>
@@ -10286,7 +10048,7 @@
       </p:pic>
       <p:pic>
         <p:nvPicPr>
-          <p:cNvPr id="4" name="Picture 3"/>
+          <p:cNvPr id="16" name="Picture 15"/>
           <p:cNvPicPr>
             <a:picLocks noChangeAspect="1"/>
           </p:cNvPicPr>
@@ -10294,36 +10056,6 @@
         </p:nvPicPr>
         <p:blipFill>
           <a:blip r:embed="rId6">
-            <a:extLst>
-              <a:ext uri="{28A0092B-C50C-407E-A947-70E740481C1C}">
-                <a14:useLocalDpi xmlns:a14="http://schemas.microsoft.com/office/drawing/2010/main" val="0"/>
-              </a:ext>
-            </a:extLst>
-          </a:blip>
-          <a:stretch>
-            <a:fillRect/>
-          </a:stretch>
-        </p:blipFill>
-        <p:spPr>
-          <a:xfrm>
-            <a:off x="19328318" y="10425615"/>
-            <a:ext cx="7091928" cy="5159937"/>
-          </a:xfrm>
-          <a:prstGeom prst="rect">
-            <a:avLst/>
-          </a:prstGeom>
-        </p:spPr>
-      </p:pic>
-      <p:pic>
-        <p:nvPicPr>
-          <p:cNvPr id="16" name="Picture 15"/>
-          <p:cNvPicPr>
-            <a:picLocks noChangeAspect="1"/>
-          </p:cNvPicPr>
-          <p:nvPr/>
-        </p:nvPicPr>
-        <p:blipFill>
-          <a:blip r:embed="rId7">
             <a:extLst>
               <a:ext uri="{28A0092B-C50C-407E-A947-70E740481C1C}">
                 <a14:useLocalDpi xmlns:a14="http://schemas.microsoft.com/office/drawing/2010/main" val="0"/>
@@ -10388,15 +10120,7 @@
                   <a:srgbClr val="1EADB3"/>
                 </a:solidFill>
               </a:rPr>
-              <a:t> in background</a:t>
-            </a:r>
-            <a:r>
-              <a:rPr lang="en-US" sz="2400" dirty="0" smtClean="0">
-                <a:solidFill>
-                  <a:srgbClr val="1EADB3"/>
-                </a:solidFill>
-              </a:rPr>
-              <a:t>&gt;&gt;&gt; Also point to important stuff using art/arrows </a:t>
+              <a:t> in background&gt;&gt;&gt; Also point to important stuff using art/arrows </a:t>
             </a:r>
             <a:endParaRPr lang="en-US" sz="2400" dirty="0">
               <a:solidFill>
@@ -10415,7 +10139,7 @@
           <p:nvPr/>
         </p:nvPicPr>
         <p:blipFill rotWithShape="1">
-          <a:blip r:embed="rId8">
+          <a:blip r:embed="rId7">
             <a:extLst>
               <a:ext uri="{28A0092B-C50C-407E-A947-70E740481C1C}">
                 <a14:useLocalDpi xmlns:a14="http://schemas.microsoft.com/office/drawing/2010/main" val="0"/>
@@ -10444,7 +10168,7 @@
           <p:nvPr/>
         </p:nvPicPr>
         <p:blipFill>
-          <a:blip r:embed="rId9">
+          <a:blip r:embed="rId8">
             <a:extLst>
               <a:ext uri="{28A0092B-C50C-407E-A947-70E740481C1C}">
                 <a14:useLocalDpi xmlns:a14="http://schemas.microsoft.com/office/drawing/2010/main" val="0"/>
@@ -10465,72 +10189,12 @@
           </a:prstGeom>
         </p:spPr>
       </p:pic>
-      <p:pic>
-        <p:nvPicPr>
-          <p:cNvPr id="52" name="Picture 51"/>
-          <p:cNvPicPr>
-            <a:picLocks noChangeAspect="1"/>
-          </p:cNvPicPr>
-          <p:nvPr/>
-        </p:nvPicPr>
-        <p:blipFill>
-          <a:blip r:embed="rId6">
-            <a:extLst>
-              <a:ext uri="{28A0092B-C50C-407E-A947-70E740481C1C}">
-                <a14:useLocalDpi xmlns:a14="http://schemas.microsoft.com/office/drawing/2010/main" val="0"/>
-              </a:ext>
-            </a:extLst>
-          </a:blip>
-          <a:stretch>
-            <a:fillRect/>
-          </a:stretch>
-        </p:blipFill>
-        <p:spPr>
-          <a:xfrm>
-            <a:off x="19324037" y="15566257"/>
-            <a:ext cx="7091928" cy="5159937"/>
-          </a:xfrm>
-          <a:prstGeom prst="rect">
-            <a:avLst/>
-          </a:prstGeom>
-        </p:spPr>
-      </p:pic>
-      <p:pic>
-        <p:nvPicPr>
-          <p:cNvPr id="53" name="Picture 52"/>
-          <p:cNvPicPr>
-            <a:picLocks noChangeAspect="1"/>
-          </p:cNvPicPr>
-          <p:nvPr/>
-        </p:nvPicPr>
-        <p:blipFill>
-          <a:blip r:embed="rId6">
-            <a:extLst>
-              <a:ext uri="{28A0092B-C50C-407E-A947-70E740481C1C}">
-                <a14:useLocalDpi xmlns:a14="http://schemas.microsoft.com/office/drawing/2010/main" val="0"/>
-              </a:ext>
-            </a:extLst>
-          </a:blip>
-          <a:stretch>
-            <a:fillRect/>
-          </a:stretch>
-        </p:blipFill>
-        <p:spPr>
-          <a:xfrm>
-            <a:off x="19353740" y="20726194"/>
-            <a:ext cx="7091928" cy="5159937"/>
-          </a:xfrm>
-          <a:prstGeom prst="rect">
-            <a:avLst/>
-          </a:prstGeom>
-        </p:spPr>
-      </p:pic>
       <p:sp>
         <p:nvSpPr>
           <p:cNvPr id="61" name="TextBox 6">
             <a:extLst>
               <a:ext uri="{FF2B5EF4-FFF2-40B4-BE49-F238E27FC236}">
-                <a16:creationId xmlns:a16="http://schemas.microsoft.com/office/drawing/2014/main" xmlns="" id="{A02677C0-3182-1744-88D1-3C5A668DCB1C}"/>
+                <a16:creationId xmlns:a16="http://schemas.microsoft.com/office/drawing/2014/main" id="{A02677C0-3182-1744-88D1-3C5A668DCB1C}"/>
               </a:ext>
             </a:extLst>
           </p:cNvPr>
@@ -10698,7 +10362,7 @@
           <p:cNvPr id="62" name="Text Box 24">
             <a:extLst>
               <a:ext uri="{FF2B5EF4-FFF2-40B4-BE49-F238E27FC236}">
-                <a16:creationId xmlns:a16="http://schemas.microsoft.com/office/drawing/2014/main" xmlns="" id="{C79FC9F3-432E-4F60-91B2-6DB09A3F6BD7}"/>
+                <a16:creationId xmlns:a16="http://schemas.microsoft.com/office/drawing/2014/main" id="{C79FC9F3-432E-4F60-91B2-6DB09A3F6BD7}"/>
               </a:ext>
             </a:extLst>
           </p:cNvPr>
@@ -10911,6 +10575,95 @@
           </a:p>
         </p:txBody>
       </p:sp>
+      <p:pic>
+        <p:nvPicPr>
+          <p:cNvPr id="5" name="Picture 4"/>
+          <p:cNvPicPr>
+            <a:picLocks noChangeAspect="1"/>
+          </p:cNvPicPr>
+          <p:nvPr/>
+        </p:nvPicPr>
+        <p:blipFill rotWithShape="1">
+          <a:blip r:embed="rId9">
+            <a:extLst>
+              <a:ext uri="{28A0092B-C50C-407E-A947-70E740481C1C}">
+                <a14:useLocalDpi xmlns:a14="http://schemas.microsoft.com/office/drawing/2010/main" val="0"/>
+              </a:ext>
+            </a:extLst>
+          </a:blip>
+          <a:srcRect t="4900"/>
+          <a:stretch/>
+        </p:blipFill>
+        <p:spPr>
+          <a:xfrm>
+            <a:off x="19120644" y="10363200"/>
+            <a:ext cx="7592576" cy="5303917"/>
+          </a:xfrm>
+          <a:prstGeom prst="rect">
+            <a:avLst/>
+          </a:prstGeom>
+        </p:spPr>
+      </p:pic>
+      <p:pic>
+        <p:nvPicPr>
+          <p:cNvPr id="10" name="Picture 9"/>
+          <p:cNvPicPr>
+            <a:picLocks noChangeAspect="1"/>
+          </p:cNvPicPr>
+          <p:nvPr/>
+        </p:nvPicPr>
+        <p:blipFill>
+          <a:blip r:embed="rId10">
+            <a:extLst>
+              <a:ext uri="{28A0092B-C50C-407E-A947-70E740481C1C}">
+                <a14:useLocalDpi xmlns:a14="http://schemas.microsoft.com/office/drawing/2010/main" val="0"/>
+              </a:ext>
+            </a:extLst>
+          </a:blip>
+          <a:stretch>
+            <a:fillRect/>
+          </a:stretch>
+        </p:blipFill>
+        <p:spPr>
+          <a:xfrm>
+            <a:off x="19126817" y="15469505"/>
+            <a:ext cx="7588400" cy="5021236"/>
+          </a:xfrm>
+          <a:prstGeom prst="rect">
+            <a:avLst/>
+          </a:prstGeom>
+        </p:spPr>
+      </p:pic>
+      <p:pic>
+        <p:nvPicPr>
+          <p:cNvPr id="14" name="Picture 13"/>
+          <p:cNvPicPr>
+            <a:picLocks noChangeAspect="1"/>
+          </p:cNvPicPr>
+          <p:nvPr/>
+        </p:nvPicPr>
+        <p:blipFill>
+          <a:blip r:embed="rId11">
+            <a:extLst>
+              <a:ext uri="{28A0092B-C50C-407E-A947-70E740481C1C}">
+                <a14:useLocalDpi xmlns:a14="http://schemas.microsoft.com/office/drawing/2010/main" val="0"/>
+              </a:ext>
+            </a:extLst>
+          </a:blip>
+          <a:stretch>
+            <a:fillRect/>
+          </a:stretch>
+        </p:blipFill>
+        <p:spPr>
+          <a:xfrm>
+            <a:off x="19126817" y="20384355"/>
+            <a:ext cx="7581283" cy="5387343"/>
+          </a:xfrm>
+          <a:prstGeom prst="rect">
+            <a:avLst/>
+          </a:prstGeom>
+        </p:spPr>
+      </p:pic>
     </p:spTree>
     <p:extLst>
       <p:ext uri="{BB962C8B-B14F-4D97-AF65-F5344CB8AC3E}">

</xml_diff>